<commit_message>
add not optimal figure
</commit_message>
<xml_diff>
--- a/figures/figures.pptx
+++ b/figures/figures.pptx
@@ -5,13 +5,14 @@
     <p:sldMasterId id="2147483648" r:id="rId1"/>
   </p:sldMasterIdLst>
   <p:notesMasterIdLst>
-    <p:notesMasterId r:id="rId6"/>
+    <p:notesMasterId r:id="rId7"/>
   </p:notesMasterIdLst>
   <p:sldIdLst>
     <p:sldId id="256" r:id="rId2"/>
     <p:sldId id="257" r:id="rId3"/>
     <p:sldId id="258" r:id="rId4"/>
     <p:sldId id="259" r:id="rId5"/>
+    <p:sldId id="260" r:id="rId6"/>
   </p:sldIdLst>
   <p:sldSz cx="9144000" cy="6858000" type="screen4x3"/>
   <p:notesSz cx="6858000" cy="9144000"/>
@@ -196,7 +197,7 @@
             <a:fld id="{507DC840-FE98-4570-9088-7CD08FF35371}" type="datetimeFigureOut">
               <a:rPr lang="en-US" smtClean="0"/>
               <a:pPr/>
-              <a:t>3/1/2011</a:t>
+              <a:t>3/28/2011</a:t>
             </a:fld>
             <a:endParaRPr lang="en-CA"/>
           </a:p>
@@ -808,7 +809,7 @@
             <a:fld id="{E8DC4A0C-9A40-4E9F-8BE1-0BD636236BA7}" type="datetimeFigureOut">
               <a:rPr lang="en-US" smtClean="0"/>
               <a:pPr/>
-              <a:t>3/1/2011</a:t>
+              <a:t>3/28/2011</a:t>
             </a:fld>
             <a:endParaRPr lang="en-CA"/>
           </a:p>
@@ -975,7 +976,7 @@
             <a:fld id="{E8DC4A0C-9A40-4E9F-8BE1-0BD636236BA7}" type="datetimeFigureOut">
               <a:rPr lang="en-US" smtClean="0"/>
               <a:pPr/>
-              <a:t>3/1/2011</a:t>
+              <a:t>3/28/2011</a:t>
             </a:fld>
             <a:endParaRPr lang="en-CA"/>
           </a:p>
@@ -1152,7 +1153,7 @@
             <a:fld id="{E8DC4A0C-9A40-4E9F-8BE1-0BD636236BA7}" type="datetimeFigureOut">
               <a:rPr lang="en-US" smtClean="0"/>
               <a:pPr/>
-              <a:t>3/1/2011</a:t>
+              <a:t>3/28/2011</a:t>
             </a:fld>
             <a:endParaRPr lang="en-CA"/>
           </a:p>
@@ -1319,7 +1320,7 @@
             <a:fld id="{E8DC4A0C-9A40-4E9F-8BE1-0BD636236BA7}" type="datetimeFigureOut">
               <a:rPr lang="en-US" smtClean="0"/>
               <a:pPr/>
-              <a:t>3/1/2011</a:t>
+              <a:t>3/28/2011</a:t>
             </a:fld>
             <a:endParaRPr lang="en-CA"/>
           </a:p>
@@ -1562,7 +1563,7 @@
             <a:fld id="{E8DC4A0C-9A40-4E9F-8BE1-0BD636236BA7}" type="datetimeFigureOut">
               <a:rPr lang="en-US" smtClean="0"/>
               <a:pPr/>
-              <a:t>3/1/2011</a:t>
+              <a:t>3/28/2011</a:t>
             </a:fld>
             <a:endParaRPr lang="en-CA"/>
           </a:p>
@@ -1847,7 +1848,7 @@
             <a:fld id="{E8DC4A0C-9A40-4E9F-8BE1-0BD636236BA7}" type="datetimeFigureOut">
               <a:rPr lang="en-US" smtClean="0"/>
               <a:pPr/>
-              <a:t>3/1/2011</a:t>
+              <a:t>3/28/2011</a:t>
             </a:fld>
             <a:endParaRPr lang="en-CA"/>
           </a:p>
@@ -2266,7 +2267,7 @@
             <a:fld id="{E8DC4A0C-9A40-4E9F-8BE1-0BD636236BA7}" type="datetimeFigureOut">
               <a:rPr lang="en-US" smtClean="0"/>
               <a:pPr/>
-              <a:t>3/1/2011</a:t>
+              <a:t>3/28/2011</a:t>
             </a:fld>
             <a:endParaRPr lang="en-CA"/>
           </a:p>
@@ -2381,7 +2382,7 @@
             <a:fld id="{E8DC4A0C-9A40-4E9F-8BE1-0BD636236BA7}" type="datetimeFigureOut">
               <a:rPr lang="en-US" smtClean="0"/>
               <a:pPr/>
-              <a:t>3/1/2011</a:t>
+              <a:t>3/28/2011</a:t>
             </a:fld>
             <a:endParaRPr lang="en-CA"/>
           </a:p>
@@ -2473,7 +2474,7 @@
             <a:fld id="{E8DC4A0C-9A40-4E9F-8BE1-0BD636236BA7}" type="datetimeFigureOut">
               <a:rPr lang="en-US" smtClean="0"/>
               <a:pPr/>
-              <a:t>3/1/2011</a:t>
+              <a:t>3/28/2011</a:t>
             </a:fld>
             <a:endParaRPr lang="en-CA"/>
           </a:p>
@@ -2747,7 +2748,7 @@
             <a:fld id="{E8DC4A0C-9A40-4E9F-8BE1-0BD636236BA7}" type="datetimeFigureOut">
               <a:rPr lang="en-US" smtClean="0"/>
               <a:pPr/>
-              <a:t>3/1/2011</a:t>
+              <a:t>3/28/2011</a:t>
             </a:fld>
             <a:endParaRPr lang="en-CA"/>
           </a:p>
@@ -2997,7 +2998,7 @@
             <a:fld id="{E8DC4A0C-9A40-4E9F-8BE1-0BD636236BA7}" type="datetimeFigureOut">
               <a:rPr lang="en-US" smtClean="0"/>
               <a:pPr/>
-              <a:t>3/1/2011</a:t>
+              <a:t>3/28/2011</a:t>
             </a:fld>
             <a:endParaRPr lang="en-CA"/>
           </a:p>
@@ -3207,7 +3208,7 @@
             <a:fld id="{E8DC4A0C-9A40-4E9F-8BE1-0BD636236BA7}" type="datetimeFigureOut">
               <a:rPr lang="en-US" smtClean="0"/>
               <a:pPr/>
-              <a:t>3/1/2011</a:t>
+              <a:t>3/28/2011</a:t>
             </a:fld>
             <a:endParaRPr lang="en-CA"/>
           </a:p>
@@ -9003,6 +9004,638 @@
           </a:graphicData>
         </a:graphic>
       </p:graphicFrame>
+    </p:spTree>
+  </p:cSld>
+  <p:clrMapOvr>
+    <a:masterClrMapping/>
+  </p:clrMapOvr>
+</p:sld>
+</file>
+
+<file path=ppt/slides/slide5.xml><?xml version="1.0" encoding="utf-8"?>
+<p:sld xmlns:a="http://schemas.openxmlformats.org/drawingml/2006/main" xmlns:r="http://schemas.openxmlformats.org/officeDocument/2006/relationships" xmlns:p="http://schemas.openxmlformats.org/presentationml/2006/main">
+  <p:cSld>
+    <p:spTree>
+      <p:nvGrpSpPr>
+        <p:cNvPr id="1" name=""/>
+        <p:cNvGrpSpPr/>
+        <p:nvPr/>
+      </p:nvGrpSpPr>
+      <p:grpSpPr>
+        <a:xfrm>
+          <a:off x="0" y="0"/>
+          <a:ext cx="0" cy="0"/>
+          <a:chOff x="0" y="0"/>
+          <a:chExt cx="0" cy="0"/>
+        </a:xfrm>
+      </p:grpSpPr>
+      <p:sp>
+        <p:nvSpPr>
+          <p:cNvPr id="2" name="標題 1"/>
+          <p:cNvSpPr>
+            <a:spLocks noGrp="1"/>
+          </p:cNvSpPr>
+          <p:nvPr>
+            <p:ph type="title"/>
+          </p:nvPr>
+        </p:nvSpPr>
+        <p:spPr/>
+        <p:txBody>
+          <a:bodyPr/>
+          <a:lstStyle/>
+          <a:p>
+            <a:endParaRPr lang="zh-TW" altLang="en-US"/>
+          </a:p>
+        </p:txBody>
+      </p:sp>
+      <p:grpSp>
+        <p:nvGrpSpPr>
+          <p:cNvPr id="31" name="群組 30"/>
+          <p:cNvGrpSpPr/>
+          <p:nvPr/>
+        </p:nvGrpSpPr>
+        <p:grpSpPr>
+          <a:xfrm>
+            <a:off x="1600200" y="2286000"/>
+            <a:ext cx="4003940" cy="2590800"/>
+            <a:chOff x="1600200" y="2286000"/>
+            <a:chExt cx="4003940" cy="2590800"/>
+          </a:xfrm>
+        </p:grpSpPr>
+        <p:sp>
+          <p:nvSpPr>
+            <p:cNvPr id="4" name="橢圓 3"/>
+            <p:cNvSpPr/>
+            <p:nvPr/>
+          </p:nvSpPr>
+          <p:spPr>
+            <a:xfrm>
+              <a:off x="1600200" y="2895600"/>
+              <a:ext cx="685800" cy="685800"/>
+            </a:xfrm>
+            <a:prstGeom prst="ellipse">
+              <a:avLst/>
+            </a:prstGeom>
+            <a:noFill/>
+            <a:ln>
+              <a:solidFill>
+                <a:schemeClr val="tx1"/>
+              </a:solidFill>
+            </a:ln>
+          </p:spPr>
+          <p:style>
+            <a:lnRef idx="2">
+              <a:schemeClr val="accent1">
+                <a:shade val="50000"/>
+              </a:schemeClr>
+            </a:lnRef>
+            <a:fillRef idx="1">
+              <a:schemeClr val="accent1"/>
+            </a:fillRef>
+            <a:effectRef idx="0">
+              <a:schemeClr val="accent1"/>
+            </a:effectRef>
+            <a:fontRef idx="minor">
+              <a:schemeClr val="lt1"/>
+            </a:fontRef>
+          </p:style>
+          <p:txBody>
+            <a:bodyPr rtlCol="0" anchor="ctr"/>
+            <a:lstStyle/>
+            <a:p>
+              <a:pPr algn="ctr"/>
+              <a:r>
+                <a:rPr lang="en-US" altLang="zh-TW" dirty="0" smtClean="0">
+                  <a:solidFill>
+                    <a:schemeClr val="tx1"/>
+                  </a:solidFill>
+                </a:rPr>
+                <a:t>S</a:t>
+              </a:r>
+              <a:r>
+                <a:rPr lang="en-US" altLang="zh-TW" baseline="-25000" dirty="0" smtClean="0">
+                  <a:solidFill>
+                    <a:schemeClr val="tx1"/>
+                  </a:solidFill>
+                </a:rPr>
+                <a:t>1</a:t>
+              </a:r>
+              <a:endParaRPr lang="zh-TW" altLang="en-US" baseline="-25000" dirty="0">
+                <a:solidFill>
+                  <a:schemeClr val="tx1"/>
+                </a:solidFill>
+              </a:endParaRPr>
+            </a:p>
+          </p:txBody>
+        </p:sp>
+        <p:sp>
+          <p:nvSpPr>
+            <p:cNvPr id="6" name="橢圓 5"/>
+            <p:cNvSpPr/>
+            <p:nvPr/>
+          </p:nvSpPr>
+          <p:spPr>
+            <a:xfrm>
+              <a:off x="4191000" y="2286000"/>
+              <a:ext cx="685800" cy="685800"/>
+            </a:xfrm>
+            <a:prstGeom prst="ellipse">
+              <a:avLst/>
+            </a:prstGeom>
+            <a:noFill/>
+            <a:ln>
+              <a:solidFill>
+                <a:schemeClr val="tx1"/>
+              </a:solidFill>
+            </a:ln>
+          </p:spPr>
+          <p:style>
+            <a:lnRef idx="2">
+              <a:schemeClr val="accent1">
+                <a:shade val="50000"/>
+              </a:schemeClr>
+            </a:lnRef>
+            <a:fillRef idx="1">
+              <a:schemeClr val="accent1"/>
+            </a:fillRef>
+            <a:effectRef idx="0">
+              <a:schemeClr val="accent1"/>
+            </a:effectRef>
+            <a:fontRef idx="minor">
+              <a:schemeClr val="lt1"/>
+            </a:fontRef>
+          </p:style>
+          <p:txBody>
+            <a:bodyPr rtlCol="0" anchor="ctr"/>
+            <a:lstStyle/>
+            <a:p>
+              <a:pPr algn="ctr"/>
+              <a:r>
+                <a:rPr lang="en-US" altLang="zh-TW" dirty="0" smtClean="0">
+                  <a:solidFill>
+                    <a:schemeClr val="tx1"/>
+                  </a:solidFill>
+                </a:rPr>
+                <a:t>S</a:t>
+              </a:r>
+              <a:r>
+                <a:rPr lang="en-US" altLang="zh-TW" baseline="-25000" dirty="0" smtClean="0">
+                  <a:solidFill>
+                    <a:schemeClr val="tx1"/>
+                  </a:solidFill>
+                </a:rPr>
+                <a:t>2</a:t>
+              </a:r>
+              <a:endParaRPr lang="zh-TW" altLang="en-US" baseline="-25000" dirty="0">
+                <a:solidFill>
+                  <a:schemeClr val="tx1"/>
+                </a:solidFill>
+              </a:endParaRPr>
+            </a:p>
+          </p:txBody>
+        </p:sp>
+        <p:sp>
+          <p:nvSpPr>
+            <p:cNvPr id="7" name="橢圓 6"/>
+            <p:cNvSpPr/>
+            <p:nvPr/>
+          </p:nvSpPr>
+          <p:spPr>
+            <a:xfrm>
+              <a:off x="4191000" y="3276600"/>
+              <a:ext cx="685800" cy="685800"/>
+            </a:xfrm>
+            <a:prstGeom prst="ellipse">
+              <a:avLst/>
+            </a:prstGeom>
+            <a:noFill/>
+            <a:ln>
+              <a:solidFill>
+                <a:schemeClr val="tx1"/>
+              </a:solidFill>
+            </a:ln>
+          </p:spPr>
+          <p:style>
+            <a:lnRef idx="2">
+              <a:schemeClr val="accent1">
+                <a:shade val="50000"/>
+              </a:schemeClr>
+            </a:lnRef>
+            <a:fillRef idx="1">
+              <a:schemeClr val="accent1"/>
+            </a:fillRef>
+            <a:effectRef idx="0">
+              <a:schemeClr val="accent1"/>
+            </a:effectRef>
+            <a:fontRef idx="minor">
+              <a:schemeClr val="lt1"/>
+            </a:fontRef>
+          </p:style>
+          <p:txBody>
+            <a:bodyPr rtlCol="0" anchor="ctr"/>
+            <a:lstStyle/>
+            <a:p>
+              <a:pPr algn="ctr"/>
+              <a:r>
+                <a:rPr lang="en-US" altLang="zh-TW" dirty="0" smtClean="0">
+                  <a:solidFill>
+                    <a:schemeClr val="tx1"/>
+                  </a:solidFill>
+                </a:rPr>
+                <a:t>S</a:t>
+              </a:r>
+              <a:r>
+                <a:rPr lang="en-US" altLang="zh-TW" baseline="-25000" dirty="0" smtClean="0">
+                  <a:solidFill>
+                    <a:schemeClr val="tx1"/>
+                  </a:solidFill>
+                </a:rPr>
+                <a:t>3</a:t>
+              </a:r>
+              <a:endParaRPr lang="zh-TW" altLang="en-US" baseline="-25000" dirty="0">
+                <a:solidFill>
+                  <a:schemeClr val="tx1"/>
+                </a:solidFill>
+              </a:endParaRPr>
+            </a:p>
+          </p:txBody>
+        </p:sp>
+        <p:sp>
+          <p:nvSpPr>
+            <p:cNvPr id="8" name="橢圓 7"/>
+            <p:cNvSpPr/>
+            <p:nvPr/>
+          </p:nvSpPr>
+          <p:spPr>
+            <a:xfrm>
+              <a:off x="4191000" y="4191000"/>
+              <a:ext cx="685800" cy="685800"/>
+            </a:xfrm>
+            <a:prstGeom prst="ellipse">
+              <a:avLst/>
+            </a:prstGeom>
+            <a:noFill/>
+            <a:ln>
+              <a:solidFill>
+                <a:schemeClr val="tx1"/>
+              </a:solidFill>
+            </a:ln>
+          </p:spPr>
+          <p:style>
+            <a:lnRef idx="2">
+              <a:schemeClr val="accent1">
+                <a:shade val="50000"/>
+              </a:schemeClr>
+            </a:lnRef>
+            <a:fillRef idx="1">
+              <a:schemeClr val="accent1"/>
+            </a:fillRef>
+            <a:effectRef idx="0">
+              <a:schemeClr val="accent1"/>
+            </a:effectRef>
+            <a:fontRef idx="minor">
+              <a:schemeClr val="lt1"/>
+            </a:fontRef>
+          </p:style>
+          <p:txBody>
+            <a:bodyPr rtlCol="0" anchor="ctr"/>
+            <a:lstStyle/>
+            <a:p>
+              <a:pPr algn="ctr"/>
+              <a:r>
+                <a:rPr lang="en-US" altLang="zh-TW" dirty="0" smtClean="0">
+                  <a:solidFill>
+                    <a:schemeClr val="tx1"/>
+                  </a:solidFill>
+                </a:rPr>
+                <a:t>S</a:t>
+              </a:r>
+              <a:r>
+                <a:rPr lang="en-US" altLang="zh-TW" baseline="-25000" dirty="0" smtClean="0">
+                  <a:solidFill>
+                    <a:schemeClr val="tx1"/>
+                  </a:solidFill>
+                </a:rPr>
+                <a:t>4</a:t>
+              </a:r>
+              <a:endParaRPr lang="zh-TW" altLang="en-US" baseline="-25000" dirty="0">
+                <a:solidFill>
+                  <a:schemeClr val="tx1"/>
+                </a:solidFill>
+              </a:endParaRPr>
+            </a:p>
+          </p:txBody>
+        </p:sp>
+        <p:cxnSp>
+          <p:nvCxnSpPr>
+            <p:cNvPr id="10" name="直線單箭頭接點 9"/>
+            <p:cNvCxnSpPr>
+              <a:stCxn id="4" idx="6"/>
+              <a:endCxn id="6" idx="2"/>
+            </p:cNvCxnSpPr>
+            <p:nvPr/>
+          </p:nvCxnSpPr>
+          <p:spPr>
+            <a:xfrm flipV="1">
+              <a:off x="2286000" y="2628900"/>
+              <a:ext cx="1905000" cy="609600"/>
+            </a:xfrm>
+            <a:prstGeom prst="straightConnector1">
+              <a:avLst/>
+            </a:prstGeom>
+            <a:ln w="31750">
+              <a:solidFill>
+                <a:schemeClr val="tx1"/>
+              </a:solidFill>
+              <a:tailEnd type="triangle"/>
+            </a:ln>
+          </p:spPr>
+          <p:style>
+            <a:lnRef idx="1">
+              <a:schemeClr val="accent1"/>
+            </a:lnRef>
+            <a:fillRef idx="0">
+              <a:schemeClr val="accent1"/>
+            </a:fillRef>
+            <a:effectRef idx="0">
+              <a:schemeClr val="accent1"/>
+            </a:effectRef>
+            <a:fontRef idx="minor">
+              <a:schemeClr val="tx1"/>
+            </a:fontRef>
+          </p:style>
+        </p:cxnSp>
+        <p:cxnSp>
+          <p:nvCxnSpPr>
+            <p:cNvPr id="11" name="直線單箭頭接點 10"/>
+            <p:cNvCxnSpPr>
+              <a:stCxn id="4" idx="6"/>
+              <a:endCxn id="7" idx="2"/>
+            </p:cNvCxnSpPr>
+            <p:nvPr/>
+          </p:nvCxnSpPr>
+          <p:spPr>
+            <a:xfrm>
+              <a:off x="2286000" y="3238500"/>
+              <a:ext cx="1905000" cy="381000"/>
+            </a:xfrm>
+            <a:prstGeom prst="straightConnector1">
+              <a:avLst/>
+            </a:prstGeom>
+            <a:ln w="31750">
+              <a:solidFill>
+                <a:schemeClr val="tx1"/>
+              </a:solidFill>
+              <a:tailEnd type="triangle"/>
+            </a:ln>
+          </p:spPr>
+          <p:style>
+            <a:lnRef idx="1">
+              <a:schemeClr val="accent1"/>
+            </a:lnRef>
+            <a:fillRef idx="0">
+              <a:schemeClr val="accent1"/>
+            </a:fillRef>
+            <a:effectRef idx="0">
+              <a:schemeClr val="accent1"/>
+            </a:effectRef>
+            <a:fontRef idx="minor">
+              <a:schemeClr val="tx1"/>
+            </a:fontRef>
+          </p:style>
+        </p:cxnSp>
+        <p:cxnSp>
+          <p:nvCxnSpPr>
+            <p:cNvPr id="14" name="直線單箭頭接點 13"/>
+            <p:cNvCxnSpPr>
+              <a:stCxn id="4" idx="6"/>
+              <a:endCxn id="8" idx="2"/>
+            </p:cNvCxnSpPr>
+            <p:nvPr/>
+          </p:nvCxnSpPr>
+          <p:spPr>
+            <a:xfrm>
+              <a:off x="2286000" y="3238500"/>
+              <a:ext cx="1905000" cy="1295400"/>
+            </a:xfrm>
+            <a:prstGeom prst="straightConnector1">
+              <a:avLst/>
+            </a:prstGeom>
+            <a:ln w="31750">
+              <a:solidFill>
+                <a:schemeClr val="tx1"/>
+              </a:solidFill>
+              <a:tailEnd type="triangle"/>
+            </a:ln>
+          </p:spPr>
+          <p:style>
+            <a:lnRef idx="1">
+              <a:schemeClr val="accent1"/>
+            </a:lnRef>
+            <a:fillRef idx="0">
+              <a:schemeClr val="accent1"/>
+            </a:fillRef>
+            <a:effectRef idx="0">
+              <a:schemeClr val="accent1"/>
+            </a:effectRef>
+            <a:fontRef idx="minor">
+              <a:schemeClr val="tx1"/>
+            </a:fontRef>
+          </p:style>
+        </p:cxnSp>
+        <p:sp>
+          <p:nvSpPr>
+            <p:cNvPr id="22" name="文字方塊 21"/>
+            <p:cNvSpPr txBox="1"/>
+            <p:nvPr/>
+          </p:nvSpPr>
+          <p:spPr>
+            <a:xfrm>
+              <a:off x="2971800" y="2438400"/>
+              <a:ext cx="697627" cy="369332"/>
+            </a:xfrm>
+            <a:prstGeom prst="rect">
+              <a:avLst/>
+            </a:prstGeom>
+            <a:noFill/>
+          </p:spPr>
+          <p:txBody>
+            <a:bodyPr wrap="none" rtlCol="0">
+              <a:spAutoFit/>
+            </a:bodyPr>
+            <a:lstStyle/>
+            <a:p>
+              <a:r>
+                <a:rPr lang="en-US" altLang="zh-TW" dirty="0" smtClean="0"/>
+                <a:t>a</a:t>
+              </a:r>
+              <a:r>
+                <a:rPr lang="en-US" altLang="zh-TW" dirty="0" smtClean="0"/>
+                <a:t>, 0.5</a:t>
+              </a:r>
+              <a:endParaRPr lang="zh-TW" altLang="en-US" dirty="0"/>
+            </a:p>
+          </p:txBody>
+        </p:sp>
+        <p:sp>
+          <p:nvSpPr>
+            <p:cNvPr id="23" name="文字方塊 22"/>
+            <p:cNvSpPr txBox="1"/>
+            <p:nvPr/>
+          </p:nvSpPr>
+          <p:spPr>
+            <a:xfrm>
+              <a:off x="2971800" y="3048000"/>
+              <a:ext cx="750526" cy="369332"/>
+            </a:xfrm>
+            <a:prstGeom prst="rect">
+              <a:avLst/>
+            </a:prstGeom>
+            <a:noFill/>
+          </p:spPr>
+          <p:txBody>
+            <a:bodyPr wrap="none" rtlCol="0">
+              <a:spAutoFit/>
+            </a:bodyPr>
+            <a:lstStyle/>
+            <a:p>
+              <a:r>
+                <a:rPr lang="en-US" altLang="zh-TW" dirty="0" smtClean="0"/>
+                <a:t>a</a:t>
+              </a:r>
+              <a:r>
+                <a:rPr lang="en-US" altLang="zh-TW" dirty="0" smtClean="0"/>
+                <a:t>, 0.5 </a:t>
+              </a:r>
+              <a:endParaRPr lang="zh-TW" altLang="en-US" dirty="0"/>
+            </a:p>
+          </p:txBody>
+        </p:sp>
+        <p:sp>
+          <p:nvSpPr>
+            <p:cNvPr id="24" name="文字方塊 23"/>
+            <p:cNvSpPr txBox="1"/>
+            <p:nvPr/>
+          </p:nvSpPr>
+          <p:spPr>
+            <a:xfrm>
+              <a:off x="2743200" y="3886200"/>
+              <a:ext cx="708848" cy="369332"/>
+            </a:xfrm>
+            <a:prstGeom prst="rect">
+              <a:avLst/>
+            </a:prstGeom>
+            <a:noFill/>
+          </p:spPr>
+          <p:txBody>
+            <a:bodyPr wrap="none" rtlCol="0">
+              <a:spAutoFit/>
+            </a:bodyPr>
+            <a:lstStyle/>
+            <a:p>
+              <a:r>
+                <a:rPr lang="en-US" altLang="zh-TW" dirty="0" smtClean="0"/>
+                <a:t>b</a:t>
+              </a:r>
+              <a:r>
+                <a:rPr lang="en-US" altLang="zh-TW" dirty="0" smtClean="0"/>
+                <a:t>, 1.0</a:t>
+              </a:r>
+              <a:endParaRPr lang="zh-TW" altLang="en-US" dirty="0"/>
+            </a:p>
+          </p:txBody>
+        </p:sp>
+        <p:sp>
+          <p:nvSpPr>
+            <p:cNvPr id="28" name="文字方塊 27"/>
+            <p:cNvSpPr txBox="1"/>
+            <p:nvPr/>
+          </p:nvSpPr>
+          <p:spPr>
+            <a:xfrm>
+              <a:off x="4953000" y="2362200"/>
+              <a:ext cx="651140" cy="369332"/>
+            </a:xfrm>
+            <a:prstGeom prst="rect">
+              <a:avLst/>
+            </a:prstGeom>
+            <a:noFill/>
+          </p:spPr>
+          <p:txBody>
+            <a:bodyPr wrap="none" rtlCol="0">
+              <a:spAutoFit/>
+            </a:bodyPr>
+            <a:lstStyle/>
+            <a:p>
+              <a:r>
+                <a:rPr lang="en-US" altLang="zh-TW" dirty="0" smtClean="0"/>
+                <a:t>+120</a:t>
+              </a:r>
+              <a:endParaRPr lang="zh-TW" altLang="en-US" dirty="0"/>
+            </a:p>
+          </p:txBody>
+        </p:sp>
+        <p:sp>
+          <p:nvSpPr>
+            <p:cNvPr id="29" name="文字方塊 28"/>
+            <p:cNvSpPr txBox="1"/>
+            <p:nvPr/>
+          </p:nvSpPr>
+          <p:spPr>
+            <a:xfrm>
+              <a:off x="4953000" y="3429000"/>
+              <a:ext cx="651140" cy="369332"/>
+            </a:xfrm>
+            <a:prstGeom prst="rect">
+              <a:avLst/>
+            </a:prstGeom>
+            <a:noFill/>
+          </p:spPr>
+          <p:txBody>
+            <a:bodyPr wrap="none" rtlCol="0">
+              <a:spAutoFit/>
+            </a:bodyPr>
+            <a:lstStyle/>
+            <a:p>
+              <a:r>
+                <a:rPr lang="en-US" altLang="zh-TW" dirty="0" smtClean="0"/>
+                <a:t>+120</a:t>
+              </a:r>
+              <a:endParaRPr lang="zh-TW" altLang="en-US" dirty="0"/>
+            </a:p>
+          </p:txBody>
+        </p:sp>
+        <p:sp>
+          <p:nvSpPr>
+            <p:cNvPr id="30" name="文字方塊 29"/>
+            <p:cNvSpPr txBox="1"/>
+            <p:nvPr/>
+          </p:nvSpPr>
+          <p:spPr>
+            <a:xfrm>
+              <a:off x="4953000" y="4419600"/>
+              <a:ext cx="651140" cy="369332"/>
+            </a:xfrm>
+            <a:prstGeom prst="rect">
+              <a:avLst/>
+            </a:prstGeom>
+            <a:noFill/>
+          </p:spPr>
+          <p:txBody>
+            <a:bodyPr wrap="none" rtlCol="0">
+              <a:spAutoFit/>
+            </a:bodyPr>
+            <a:lstStyle/>
+            <a:p>
+              <a:r>
+                <a:rPr lang="en-US" altLang="zh-TW" dirty="0" smtClean="0"/>
+                <a:t>+100</a:t>
+              </a:r>
+              <a:endParaRPr lang="zh-TW" altLang="en-US" dirty="0"/>
+            </a:p>
+          </p:txBody>
+        </p:sp>
+      </p:grpSp>
     </p:spTree>
   </p:cSld>
   <p:clrMapOvr>

</xml_diff>